<commit_message>
update workflow fig and change title levels
</commit_message>
<xml_diff>
--- a/book/img/ApRES_ARCO_figs.pptx
+++ b/book/img/ApRES_ARCO_figs.pptx
@@ -11257,13 +11257,15 @@
               </a:ext>
             </a:extLst>
           </p:cNvPr>
-          <p:cNvSpPr/>
+          <p:cNvSpPr>
+            <a:spLocks/>
+          </p:cNvSpPr>
           <p:nvPr/>
         </p:nvSpPr>
         <p:spPr>
           <a:xfrm>
             <a:off x="6914256" y="848624"/>
-            <a:ext cx="70889" cy="77978"/>
+            <a:ext cx="45720" cy="45720"/>
           </a:xfrm>
           <a:prstGeom prst="ellipse">
             <a:avLst/>
@@ -11302,114 +11304,6 @@
           </a:p>
         </p:txBody>
       </p:sp>
-      <p:sp>
-        <p:nvSpPr>
-          <p:cNvPr id="12" name="Oval 11">
-            <a:extLst>
-              <a:ext uri="{FF2B5EF4-FFF2-40B4-BE49-F238E27FC236}">
-                <a16:creationId xmlns:a16="http://schemas.microsoft.com/office/drawing/2014/main" id="{F7854465-A268-8665-7D4B-DA5309017BB9}"/>
-              </a:ext>
-            </a:extLst>
-          </p:cNvPr>
-          <p:cNvSpPr/>
-          <p:nvPr/>
-        </p:nvSpPr>
-        <p:spPr>
-          <a:xfrm>
-            <a:off x="7107452" y="848624"/>
-            <a:ext cx="70889" cy="77978"/>
-          </a:xfrm>
-          <a:prstGeom prst="ellipse">
-            <a:avLst/>
-          </a:prstGeom>
-          <a:solidFill>
-            <a:schemeClr val="tx1"/>
-          </a:solidFill>
-          <a:ln>
-            <a:solidFill>
-              <a:schemeClr val="tx1"/>
-            </a:solidFill>
-          </a:ln>
-        </p:spPr>
-        <p:style>
-          <a:lnRef idx="2">
-            <a:schemeClr val="accent1">
-              <a:shade val="15000"/>
-            </a:schemeClr>
-          </a:lnRef>
-          <a:fillRef idx="1">
-            <a:schemeClr val="accent1"/>
-          </a:fillRef>
-          <a:effectRef idx="0">
-            <a:schemeClr val="accent1"/>
-          </a:effectRef>
-          <a:fontRef idx="minor">
-            <a:schemeClr val="lt1"/>
-          </a:fontRef>
-        </p:style>
-        <p:txBody>
-          <a:bodyPr rtlCol="0" anchor="ctr"/>
-          <a:lstStyle/>
-          <a:p>
-            <a:pPr algn="ctr"/>
-            <a:endParaRPr lang="en-US"/>
-          </a:p>
-        </p:txBody>
-      </p:sp>
-      <p:sp>
-        <p:nvSpPr>
-          <p:cNvPr id="13" name="Oval 12">
-            <a:extLst>
-              <a:ext uri="{FF2B5EF4-FFF2-40B4-BE49-F238E27FC236}">
-                <a16:creationId xmlns:a16="http://schemas.microsoft.com/office/drawing/2014/main" id="{09C57B42-3F4F-9180-B54B-535BE8EC25C6}"/>
-              </a:ext>
-            </a:extLst>
-          </p:cNvPr>
-          <p:cNvSpPr/>
-          <p:nvPr/>
-        </p:nvSpPr>
-        <p:spPr>
-          <a:xfrm>
-            <a:off x="7300648" y="848624"/>
-            <a:ext cx="70889" cy="77978"/>
-          </a:xfrm>
-          <a:prstGeom prst="ellipse">
-            <a:avLst/>
-          </a:prstGeom>
-          <a:solidFill>
-            <a:schemeClr val="tx1"/>
-          </a:solidFill>
-          <a:ln>
-            <a:solidFill>
-              <a:schemeClr val="tx1"/>
-            </a:solidFill>
-          </a:ln>
-        </p:spPr>
-        <p:style>
-          <a:lnRef idx="2">
-            <a:schemeClr val="accent1">
-              <a:shade val="15000"/>
-            </a:schemeClr>
-          </a:lnRef>
-          <a:fillRef idx="1">
-            <a:schemeClr val="accent1"/>
-          </a:fillRef>
-          <a:effectRef idx="0">
-            <a:schemeClr val="accent1"/>
-          </a:effectRef>
-          <a:fontRef idx="minor">
-            <a:schemeClr val="lt1"/>
-          </a:fontRef>
-        </p:style>
-        <p:txBody>
-          <a:bodyPr rtlCol="0" anchor="ctr"/>
-          <a:lstStyle/>
-          <a:p>
-            <a:pPr algn="ctr"/>
-            <a:endParaRPr lang="en-US"/>
-          </a:p>
-        </p:txBody>
-      </p:sp>
       <p:cxnSp>
         <p:nvCxnSpPr>
           <p:cNvPr id="17" name="Straight Connector 16">
@@ -11555,7 +11449,7 @@
         </p:nvCxnSpPr>
         <p:spPr>
           <a:xfrm>
-            <a:off x="4473335" y="1743077"/>
+            <a:off x="4473335" y="1730377"/>
             <a:ext cx="0" cy="348135"/>
           </a:xfrm>
           <a:prstGeom prst="line">
@@ -12421,7 +12315,7 @@
         </p:nvCxnSpPr>
         <p:spPr>
           <a:xfrm>
-            <a:off x="4450401" y="3302588"/>
+            <a:off x="4475801" y="3293063"/>
             <a:ext cx="0" cy="348135"/>
           </a:xfrm>
           <a:prstGeom prst="line">
@@ -12466,7 +12360,7 @@
         </p:nvCxnSpPr>
         <p:spPr>
           <a:xfrm>
-            <a:off x="5446181" y="3296636"/>
+            <a:off x="5462056" y="3296636"/>
             <a:ext cx="0" cy="348135"/>
           </a:xfrm>
           <a:prstGeom prst="line">
@@ -12554,7 +12448,7 @@
         </p:nvSpPr>
         <p:spPr>
           <a:xfrm>
-            <a:off x="4057321" y="3572593"/>
+            <a:off x="4057321" y="3557132"/>
             <a:ext cx="1020360" cy="307777"/>
           </a:xfrm>
           <a:prstGeom prst="rect">
@@ -12601,7 +12495,7 @@
         </p:nvSpPr>
         <p:spPr>
           <a:xfrm>
-            <a:off x="5063114" y="3557141"/>
+            <a:off x="5063114" y="3557132"/>
             <a:ext cx="1020360" cy="307777"/>
           </a:xfrm>
           <a:prstGeom prst="rect">
@@ -12648,7 +12542,7 @@
         </p:nvSpPr>
         <p:spPr>
           <a:xfrm>
-            <a:off x="6064157" y="3545201"/>
+            <a:off x="6095740" y="3557132"/>
             <a:ext cx="1020360" cy="307777"/>
           </a:xfrm>
           <a:prstGeom prst="rect">
@@ -12697,7 +12591,7 @@
         </p:nvCxnSpPr>
         <p:spPr>
           <a:xfrm>
-            <a:off x="4450401" y="2853115"/>
+            <a:off x="4475801" y="2853115"/>
             <a:ext cx="0" cy="177696"/>
           </a:xfrm>
           <a:prstGeom prst="line">
@@ -12740,7 +12634,7 @@
         </p:nvCxnSpPr>
         <p:spPr>
           <a:xfrm>
-            <a:off x="5446181" y="2840901"/>
+            <a:off x="5462056" y="2840901"/>
             <a:ext cx="0" cy="189911"/>
           </a:xfrm>
           <a:prstGeom prst="line">
@@ -12810,330 +12704,6 @@
           </a:fontRef>
         </p:style>
       </p:cxnSp>
-      <p:sp>
-        <p:nvSpPr>
-          <p:cNvPr id="70" name="Oval 69">
-            <a:extLst>
-              <a:ext uri="{FF2B5EF4-FFF2-40B4-BE49-F238E27FC236}">
-                <a16:creationId xmlns:a16="http://schemas.microsoft.com/office/drawing/2014/main" id="{E39103AC-25C2-AFEB-780A-CB3809739C24}"/>
-              </a:ext>
-            </a:extLst>
-          </p:cNvPr>
-          <p:cNvSpPr/>
-          <p:nvPr/>
-        </p:nvSpPr>
-        <p:spPr>
-          <a:xfrm>
-            <a:off x="6891322" y="2537897"/>
-            <a:ext cx="70889" cy="77978"/>
-          </a:xfrm>
-          <a:prstGeom prst="ellipse">
-            <a:avLst/>
-          </a:prstGeom>
-          <a:solidFill>
-            <a:schemeClr val="tx1"/>
-          </a:solidFill>
-          <a:ln>
-            <a:solidFill>
-              <a:schemeClr val="tx1"/>
-            </a:solidFill>
-          </a:ln>
-        </p:spPr>
-        <p:style>
-          <a:lnRef idx="2">
-            <a:schemeClr val="accent1">
-              <a:shade val="15000"/>
-            </a:schemeClr>
-          </a:lnRef>
-          <a:fillRef idx="1">
-            <a:schemeClr val="accent1"/>
-          </a:fillRef>
-          <a:effectRef idx="0">
-            <a:schemeClr val="accent1"/>
-          </a:effectRef>
-          <a:fontRef idx="minor">
-            <a:schemeClr val="lt1"/>
-          </a:fontRef>
-        </p:style>
-        <p:txBody>
-          <a:bodyPr rtlCol="0" anchor="ctr"/>
-          <a:lstStyle/>
-          <a:p>
-            <a:pPr algn="ctr"/>
-            <a:endParaRPr lang="en-US"/>
-          </a:p>
-        </p:txBody>
-      </p:sp>
-      <p:sp>
-        <p:nvSpPr>
-          <p:cNvPr id="71" name="Oval 70">
-            <a:extLst>
-              <a:ext uri="{FF2B5EF4-FFF2-40B4-BE49-F238E27FC236}">
-                <a16:creationId xmlns:a16="http://schemas.microsoft.com/office/drawing/2014/main" id="{4E92ED15-11A6-A126-2914-42267D4D10A2}"/>
-              </a:ext>
-            </a:extLst>
-          </p:cNvPr>
-          <p:cNvSpPr/>
-          <p:nvPr/>
-        </p:nvSpPr>
-        <p:spPr>
-          <a:xfrm>
-            <a:off x="7084518" y="2537897"/>
-            <a:ext cx="70889" cy="77978"/>
-          </a:xfrm>
-          <a:prstGeom prst="ellipse">
-            <a:avLst/>
-          </a:prstGeom>
-          <a:solidFill>
-            <a:schemeClr val="tx1"/>
-          </a:solidFill>
-          <a:ln>
-            <a:solidFill>
-              <a:schemeClr val="tx1"/>
-            </a:solidFill>
-          </a:ln>
-        </p:spPr>
-        <p:style>
-          <a:lnRef idx="2">
-            <a:schemeClr val="accent1">
-              <a:shade val="15000"/>
-            </a:schemeClr>
-          </a:lnRef>
-          <a:fillRef idx="1">
-            <a:schemeClr val="accent1"/>
-          </a:fillRef>
-          <a:effectRef idx="0">
-            <a:schemeClr val="accent1"/>
-          </a:effectRef>
-          <a:fontRef idx="minor">
-            <a:schemeClr val="lt1"/>
-          </a:fontRef>
-        </p:style>
-        <p:txBody>
-          <a:bodyPr rtlCol="0" anchor="ctr"/>
-          <a:lstStyle/>
-          <a:p>
-            <a:pPr algn="ctr"/>
-            <a:endParaRPr lang="en-US"/>
-          </a:p>
-        </p:txBody>
-      </p:sp>
-      <p:sp>
-        <p:nvSpPr>
-          <p:cNvPr id="72" name="Oval 71">
-            <a:extLst>
-              <a:ext uri="{FF2B5EF4-FFF2-40B4-BE49-F238E27FC236}">
-                <a16:creationId xmlns:a16="http://schemas.microsoft.com/office/drawing/2014/main" id="{CC6C5805-DB85-CEC9-AA76-0A9AD0E96639}"/>
-              </a:ext>
-            </a:extLst>
-          </p:cNvPr>
-          <p:cNvSpPr/>
-          <p:nvPr/>
-        </p:nvSpPr>
-        <p:spPr>
-          <a:xfrm>
-            <a:off x="7277714" y="2537897"/>
-            <a:ext cx="70889" cy="77978"/>
-          </a:xfrm>
-          <a:prstGeom prst="ellipse">
-            <a:avLst/>
-          </a:prstGeom>
-          <a:solidFill>
-            <a:schemeClr val="tx1"/>
-          </a:solidFill>
-          <a:ln>
-            <a:solidFill>
-              <a:schemeClr val="tx1"/>
-            </a:solidFill>
-          </a:ln>
-        </p:spPr>
-        <p:style>
-          <a:lnRef idx="2">
-            <a:schemeClr val="accent1">
-              <a:shade val="15000"/>
-            </a:schemeClr>
-          </a:lnRef>
-          <a:fillRef idx="1">
-            <a:schemeClr val="accent1"/>
-          </a:fillRef>
-          <a:effectRef idx="0">
-            <a:schemeClr val="accent1"/>
-          </a:effectRef>
-          <a:fontRef idx="minor">
-            <a:schemeClr val="lt1"/>
-          </a:fontRef>
-        </p:style>
-        <p:txBody>
-          <a:bodyPr rtlCol="0" anchor="ctr"/>
-          <a:lstStyle/>
-          <a:p>
-            <a:pPr algn="ctr"/>
-            <a:endParaRPr lang="en-US"/>
-          </a:p>
-        </p:txBody>
-      </p:sp>
-      <p:sp>
-        <p:nvSpPr>
-          <p:cNvPr id="73" name="Oval 72">
-            <a:extLst>
-              <a:ext uri="{FF2B5EF4-FFF2-40B4-BE49-F238E27FC236}">
-                <a16:creationId xmlns:a16="http://schemas.microsoft.com/office/drawing/2014/main" id="{277244BB-4BA6-5867-2A75-3A96DD121641}"/>
-              </a:ext>
-            </a:extLst>
-          </p:cNvPr>
-          <p:cNvSpPr/>
-          <p:nvPr/>
-        </p:nvSpPr>
-        <p:spPr>
-          <a:xfrm>
-            <a:off x="6828692" y="3999140"/>
-            <a:ext cx="70889" cy="77978"/>
-          </a:xfrm>
-          <a:prstGeom prst="ellipse">
-            <a:avLst/>
-          </a:prstGeom>
-          <a:solidFill>
-            <a:schemeClr val="tx1"/>
-          </a:solidFill>
-          <a:ln>
-            <a:solidFill>
-              <a:schemeClr val="tx1"/>
-            </a:solidFill>
-          </a:ln>
-        </p:spPr>
-        <p:style>
-          <a:lnRef idx="2">
-            <a:schemeClr val="accent1">
-              <a:shade val="15000"/>
-            </a:schemeClr>
-          </a:lnRef>
-          <a:fillRef idx="1">
-            <a:schemeClr val="accent1"/>
-          </a:fillRef>
-          <a:effectRef idx="0">
-            <a:schemeClr val="accent1"/>
-          </a:effectRef>
-          <a:fontRef idx="minor">
-            <a:schemeClr val="lt1"/>
-          </a:fontRef>
-        </p:style>
-        <p:txBody>
-          <a:bodyPr rtlCol="0" anchor="ctr"/>
-          <a:lstStyle/>
-          <a:p>
-            <a:pPr algn="ctr"/>
-            <a:endParaRPr lang="en-US"/>
-          </a:p>
-        </p:txBody>
-      </p:sp>
-      <p:sp>
-        <p:nvSpPr>
-          <p:cNvPr id="74" name="Oval 73">
-            <a:extLst>
-              <a:ext uri="{FF2B5EF4-FFF2-40B4-BE49-F238E27FC236}">
-                <a16:creationId xmlns:a16="http://schemas.microsoft.com/office/drawing/2014/main" id="{2AA8F936-E62A-2BDB-CF95-99A76D9C5CD1}"/>
-              </a:ext>
-            </a:extLst>
-          </p:cNvPr>
-          <p:cNvSpPr/>
-          <p:nvPr/>
-        </p:nvSpPr>
-        <p:spPr>
-          <a:xfrm>
-            <a:off x="7021888" y="3999140"/>
-            <a:ext cx="70889" cy="77978"/>
-          </a:xfrm>
-          <a:prstGeom prst="ellipse">
-            <a:avLst/>
-          </a:prstGeom>
-          <a:solidFill>
-            <a:schemeClr val="tx1"/>
-          </a:solidFill>
-          <a:ln>
-            <a:solidFill>
-              <a:schemeClr val="tx1"/>
-            </a:solidFill>
-          </a:ln>
-        </p:spPr>
-        <p:style>
-          <a:lnRef idx="2">
-            <a:schemeClr val="accent1">
-              <a:shade val="15000"/>
-            </a:schemeClr>
-          </a:lnRef>
-          <a:fillRef idx="1">
-            <a:schemeClr val="accent1"/>
-          </a:fillRef>
-          <a:effectRef idx="0">
-            <a:schemeClr val="accent1"/>
-          </a:effectRef>
-          <a:fontRef idx="minor">
-            <a:schemeClr val="lt1"/>
-          </a:fontRef>
-        </p:style>
-        <p:txBody>
-          <a:bodyPr rtlCol="0" anchor="ctr"/>
-          <a:lstStyle/>
-          <a:p>
-            <a:pPr algn="ctr"/>
-            <a:endParaRPr lang="en-US"/>
-          </a:p>
-        </p:txBody>
-      </p:sp>
-      <p:sp>
-        <p:nvSpPr>
-          <p:cNvPr id="75" name="Oval 74">
-            <a:extLst>
-              <a:ext uri="{FF2B5EF4-FFF2-40B4-BE49-F238E27FC236}">
-                <a16:creationId xmlns:a16="http://schemas.microsoft.com/office/drawing/2014/main" id="{9BED31BA-05B2-C838-4DD1-8FF749C1A715}"/>
-              </a:ext>
-            </a:extLst>
-          </p:cNvPr>
-          <p:cNvSpPr/>
-          <p:nvPr/>
-        </p:nvSpPr>
-        <p:spPr>
-          <a:xfrm>
-            <a:off x="7215084" y="3999140"/>
-            <a:ext cx="70889" cy="77978"/>
-          </a:xfrm>
-          <a:prstGeom prst="ellipse">
-            <a:avLst/>
-          </a:prstGeom>
-          <a:solidFill>
-            <a:schemeClr val="tx1"/>
-          </a:solidFill>
-          <a:ln>
-            <a:solidFill>
-              <a:schemeClr val="tx1"/>
-            </a:solidFill>
-          </a:ln>
-        </p:spPr>
-        <p:style>
-          <a:lnRef idx="2">
-            <a:schemeClr val="accent1">
-              <a:shade val="15000"/>
-            </a:schemeClr>
-          </a:lnRef>
-          <a:fillRef idx="1">
-            <a:schemeClr val="accent1"/>
-          </a:fillRef>
-          <a:effectRef idx="0">
-            <a:schemeClr val="accent1"/>
-          </a:effectRef>
-          <a:fontRef idx="minor">
-            <a:schemeClr val="lt1"/>
-          </a:fontRef>
-        </p:style>
-        <p:txBody>
-          <a:bodyPr rtlCol="0" anchor="ctr"/>
-          <a:lstStyle/>
-          <a:p>
-            <a:pPr algn="ctr"/>
-            <a:endParaRPr lang="en-US"/>
-          </a:p>
-        </p:txBody>
-      </p:sp>
       <p:sp>
         <p:nvSpPr>
           <p:cNvPr id="76" name="TextBox 75">
@@ -13333,7 +12903,7 @@
         </p:nvSpPr>
         <p:spPr>
           <a:xfrm>
-            <a:off x="4100062" y="4960758"/>
+            <a:off x="4122287" y="4960758"/>
             <a:ext cx="1020360" cy="307777"/>
           </a:xfrm>
           <a:prstGeom prst="rect">
@@ -13589,168 +13159,6 @@
           </a:fontRef>
         </p:style>
       </p:cxnSp>
-      <p:sp>
-        <p:nvSpPr>
-          <p:cNvPr id="98" name="Oval 97">
-            <a:extLst>
-              <a:ext uri="{FF2B5EF4-FFF2-40B4-BE49-F238E27FC236}">
-                <a16:creationId xmlns:a16="http://schemas.microsoft.com/office/drawing/2014/main" id="{8684C358-1BDB-8926-CB71-F178953784A9}"/>
-              </a:ext>
-            </a:extLst>
-          </p:cNvPr>
-          <p:cNvSpPr/>
-          <p:nvPr/>
-        </p:nvSpPr>
-        <p:spPr>
-          <a:xfrm>
-            <a:off x="6840118" y="5387305"/>
-            <a:ext cx="70889" cy="77978"/>
-          </a:xfrm>
-          <a:prstGeom prst="ellipse">
-            <a:avLst/>
-          </a:prstGeom>
-          <a:solidFill>
-            <a:schemeClr val="tx1"/>
-          </a:solidFill>
-          <a:ln>
-            <a:solidFill>
-              <a:schemeClr val="tx1"/>
-            </a:solidFill>
-          </a:ln>
-        </p:spPr>
-        <p:style>
-          <a:lnRef idx="2">
-            <a:schemeClr val="accent1">
-              <a:shade val="15000"/>
-            </a:schemeClr>
-          </a:lnRef>
-          <a:fillRef idx="1">
-            <a:schemeClr val="accent1"/>
-          </a:fillRef>
-          <a:effectRef idx="0">
-            <a:schemeClr val="accent1"/>
-          </a:effectRef>
-          <a:fontRef idx="minor">
-            <a:schemeClr val="lt1"/>
-          </a:fontRef>
-        </p:style>
-        <p:txBody>
-          <a:bodyPr rtlCol="0" anchor="ctr"/>
-          <a:lstStyle/>
-          <a:p>
-            <a:pPr algn="ctr"/>
-            <a:endParaRPr lang="en-US"/>
-          </a:p>
-        </p:txBody>
-      </p:sp>
-      <p:sp>
-        <p:nvSpPr>
-          <p:cNvPr id="99" name="Oval 98">
-            <a:extLst>
-              <a:ext uri="{FF2B5EF4-FFF2-40B4-BE49-F238E27FC236}">
-                <a16:creationId xmlns:a16="http://schemas.microsoft.com/office/drawing/2014/main" id="{3A66B849-F5A5-34AF-C19E-3579E9D09A3A}"/>
-              </a:ext>
-            </a:extLst>
-          </p:cNvPr>
-          <p:cNvSpPr/>
-          <p:nvPr/>
-        </p:nvSpPr>
-        <p:spPr>
-          <a:xfrm>
-            <a:off x="7033314" y="5387305"/>
-            <a:ext cx="70889" cy="77978"/>
-          </a:xfrm>
-          <a:prstGeom prst="ellipse">
-            <a:avLst/>
-          </a:prstGeom>
-          <a:solidFill>
-            <a:schemeClr val="tx1"/>
-          </a:solidFill>
-          <a:ln>
-            <a:solidFill>
-              <a:schemeClr val="tx1"/>
-            </a:solidFill>
-          </a:ln>
-        </p:spPr>
-        <p:style>
-          <a:lnRef idx="2">
-            <a:schemeClr val="accent1">
-              <a:shade val="15000"/>
-            </a:schemeClr>
-          </a:lnRef>
-          <a:fillRef idx="1">
-            <a:schemeClr val="accent1"/>
-          </a:fillRef>
-          <a:effectRef idx="0">
-            <a:schemeClr val="accent1"/>
-          </a:effectRef>
-          <a:fontRef idx="minor">
-            <a:schemeClr val="lt1"/>
-          </a:fontRef>
-        </p:style>
-        <p:txBody>
-          <a:bodyPr rtlCol="0" anchor="ctr"/>
-          <a:lstStyle/>
-          <a:p>
-            <a:pPr algn="ctr"/>
-            <a:endParaRPr lang="en-US"/>
-          </a:p>
-        </p:txBody>
-      </p:sp>
-      <p:sp>
-        <p:nvSpPr>
-          <p:cNvPr id="100" name="Oval 99">
-            <a:extLst>
-              <a:ext uri="{FF2B5EF4-FFF2-40B4-BE49-F238E27FC236}">
-                <a16:creationId xmlns:a16="http://schemas.microsoft.com/office/drawing/2014/main" id="{EDDF5FA5-DC93-5B35-8CE8-43E8BA820283}"/>
-              </a:ext>
-            </a:extLst>
-          </p:cNvPr>
-          <p:cNvSpPr/>
-          <p:nvPr/>
-        </p:nvSpPr>
-        <p:spPr>
-          <a:xfrm>
-            <a:off x="7226510" y="5387305"/>
-            <a:ext cx="70889" cy="77978"/>
-          </a:xfrm>
-          <a:prstGeom prst="ellipse">
-            <a:avLst/>
-          </a:prstGeom>
-          <a:solidFill>
-            <a:schemeClr val="tx1"/>
-          </a:solidFill>
-          <a:ln>
-            <a:solidFill>
-              <a:schemeClr val="tx1"/>
-            </a:solidFill>
-          </a:ln>
-        </p:spPr>
-        <p:style>
-          <a:lnRef idx="2">
-            <a:schemeClr val="accent1">
-              <a:shade val="15000"/>
-            </a:schemeClr>
-          </a:lnRef>
-          <a:fillRef idx="1">
-            <a:schemeClr val="accent1"/>
-          </a:fillRef>
-          <a:effectRef idx="0">
-            <a:schemeClr val="accent1"/>
-          </a:effectRef>
-          <a:fontRef idx="minor">
-            <a:schemeClr val="lt1"/>
-          </a:fontRef>
-        </p:style>
-        <p:txBody>
-          <a:bodyPr rtlCol="0" anchor="ctr"/>
-          <a:lstStyle/>
-          <a:p>
-            <a:pPr algn="ctr"/>
-            <a:endParaRPr lang="en-US"/>
-          </a:p>
-        </p:txBody>
-      </p:sp>
       <p:pic>
         <p:nvPicPr>
           <p:cNvPr id="1028" name="Picture 4" descr="Zarr">
@@ -14280,14 +13688,13 @@
           </p:cNvPr>
           <p:cNvCxnSpPr>
             <a:cxnSpLocks/>
-            <a:endCxn id="112" idx="0"/>
           </p:cNvCxnSpPr>
           <p:nvPr/>
         </p:nvCxnSpPr>
         <p:spPr>
           <a:xfrm>
-            <a:off x="8796341" y="4785520"/>
-            <a:ext cx="1" cy="158240"/>
+            <a:off x="8793147" y="4736700"/>
+            <a:ext cx="3195" cy="168310"/>
           </a:xfrm>
           <a:prstGeom prst="line">
             <a:avLst/>
@@ -14642,7 +14049,7 @@
         </p:nvCxnSpPr>
         <p:spPr>
           <a:xfrm>
-            <a:off x="8793147" y="2566951"/>
+            <a:off x="8793147" y="2512701"/>
             <a:ext cx="0" cy="189911"/>
           </a:xfrm>
           <a:prstGeom prst="line">
@@ -14716,6 +14123,643 @@
           </a:extLst>
         </p:spPr>
       </p:pic>
+      <p:sp>
+        <p:nvSpPr>
+          <p:cNvPr id="1037" name="Oval 1036">
+            <a:extLst>
+              <a:ext uri="{FF2B5EF4-FFF2-40B4-BE49-F238E27FC236}">
+                <a16:creationId xmlns:a16="http://schemas.microsoft.com/office/drawing/2014/main" id="{ED85BBD7-5D89-74FE-385F-C21DE25682AA}"/>
+              </a:ext>
+            </a:extLst>
+          </p:cNvPr>
+          <p:cNvSpPr>
+            <a:spLocks/>
+          </p:cNvSpPr>
+          <p:nvPr/>
+        </p:nvSpPr>
+        <p:spPr>
+          <a:xfrm>
+            <a:off x="7023402" y="848624"/>
+            <a:ext cx="45720" cy="45720"/>
+          </a:xfrm>
+          <a:prstGeom prst="ellipse">
+            <a:avLst/>
+          </a:prstGeom>
+          <a:solidFill>
+            <a:schemeClr val="tx1"/>
+          </a:solidFill>
+          <a:ln>
+            <a:solidFill>
+              <a:schemeClr val="tx1"/>
+            </a:solidFill>
+          </a:ln>
+        </p:spPr>
+        <p:style>
+          <a:lnRef idx="2">
+            <a:schemeClr val="accent1">
+              <a:shade val="15000"/>
+            </a:schemeClr>
+          </a:lnRef>
+          <a:fillRef idx="1">
+            <a:schemeClr val="accent1"/>
+          </a:fillRef>
+          <a:effectRef idx="0">
+            <a:schemeClr val="accent1"/>
+          </a:effectRef>
+          <a:fontRef idx="minor">
+            <a:schemeClr val="lt1"/>
+          </a:fontRef>
+        </p:style>
+        <p:txBody>
+          <a:bodyPr rtlCol="0" anchor="ctr"/>
+          <a:lstStyle/>
+          <a:p>
+            <a:pPr algn="ctr"/>
+            <a:endParaRPr lang="en-US"/>
+          </a:p>
+        </p:txBody>
+      </p:sp>
+      <p:sp>
+        <p:nvSpPr>
+          <p:cNvPr id="1038" name="Oval 1037">
+            <a:extLst>
+              <a:ext uri="{FF2B5EF4-FFF2-40B4-BE49-F238E27FC236}">
+                <a16:creationId xmlns:a16="http://schemas.microsoft.com/office/drawing/2014/main" id="{39BF9032-9F96-3D1D-D92A-9BFC607E23C8}"/>
+              </a:ext>
+            </a:extLst>
+          </p:cNvPr>
+          <p:cNvSpPr>
+            <a:spLocks/>
+          </p:cNvSpPr>
+          <p:nvPr/>
+        </p:nvSpPr>
+        <p:spPr>
+          <a:xfrm>
+            <a:off x="7132547" y="848624"/>
+            <a:ext cx="45720" cy="45720"/>
+          </a:xfrm>
+          <a:prstGeom prst="ellipse">
+            <a:avLst/>
+          </a:prstGeom>
+          <a:solidFill>
+            <a:schemeClr val="tx1"/>
+          </a:solidFill>
+          <a:ln>
+            <a:solidFill>
+              <a:schemeClr val="tx1"/>
+            </a:solidFill>
+          </a:ln>
+        </p:spPr>
+        <p:style>
+          <a:lnRef idx="2">
+            <a:schemeClr val="accent1">
+              <a:shade val="15000"/>
+            </a:schemeClr>
+          </a:lnRef>
+          <a:fillRef idx="1">
+            <a:schemeClr val="accent1"/>
+          </a:fillRef>
+          <a:effectRef idx="0">
+            <a:schemeClr val="accent1"/>
+          </a:effectRef>
+          <a:fontRef idx="minor">
+            <a:schemeClr val="lt1"/>
+          </a:fontRef>
+        </p:style>
+        <p:txBody>
+          <a:bodyPr rtlCol="0" anchor="ctr"/>
+          <a:lstStyle/>
+          <a:p>
+            <a:pPr algn="ctr"/>
+            <a:endParaRPr lang="en-US"/>
+          </a:p>
+        </p:txBody>
+      </p:sp>
+      <p:sp>
+        <p:nvSpPr>
+          <p:cNvPr id="1039" name="Oval 1038">
+            <a:extLst>
+              <a:ext uri="{FF2B5EF4-FFF2-40B4-BE49-F238E27FC236}">
+                <a16:creationId xmlns:a16="http://schemas.microsoft.com/office/drawing/2014/main" id="{F2231F52-0A94-A827-A636-E8297CDB874B}"/>
+              </a:ext>
+            </a:extLst>
+          </p:cNvPr>
+          <p:cNvSpPr>
+            <a:spLocks/>
+          </p:cNvSpPr>
+          <p:nvPr/>
+        </p:nvSpPr>
+        <p:spPr>
+          <a:xfrm>
+            <a:off x="6914256" y="2521231"/>
+            <a:ext cx="45720" cy="45720"/>
+          </a:xfrm>
+          <a:prstGeom prst="ellipse">
+            <a:avLst/>
+          </a:prstGeom>
+          <a:solidFill>
+            <a:schemeClr val="tx1"/>
+          </a:solidFill>
+          <a:ln>
+            <a:solidFill>
+              <a:schemeClr val="tx1"/>
+            </a:solidFill>
+          </a:ln>
+        </p:spPr>
+        <p:style>
+          <a:lnRef idx="2">
+            <a:schemeClr val="accent1">
+              <a:shade val="15000"/>
+            </a:schemeClr>
+          </a:lnRef>
+          <a:fillRef idx="1">
+            <a:schemeClr val="accent1"/>
+          </a:fillRef>
+          <a:effectRef idx="0">
+            <a:schemeClr val="accent1"/>
+          </a:effectRef>
+          <a:fontRef idx="minor">
+            <a:schemeClr val="lt1"/>
+          </a:fontRef>
+        </p:style>
+        <p:txBody>
+          <a:bodyPr rtlCol="0" anchor="ctr"/>
+          <a:lstStyle/>
+          <a:p>
+            <a:pPr algn="ctr"/>
+            <a:endParaRPr lang="en-US"/>
+          </a:p>
+        </p:txBody>
+      </p:sp>
+      <p:sp>
+        <p:nvSpPr>
+          <p:cNvPr id="1040" name="Oval 1039">
+            <a:extLst>
+              <a:ext uri="{FF2B5EF4-FFF2-40B4-BE49-F238E27FC236}">
+                <a16:creationId xmlns:a16="http://schemas.microsoft.com/office/drawing/2014/main" id="{6EF448C9-3D80-817F-0DFD-1D7C7C26F3AB}"/>
+              </a:ext>
+            </a:extLst>
+          </p:cNvPr>
+          <p:cNvSpPr>
+            <a:spLocks/>
+          </p:cNvSpPr>
+          <p:nvPr/>
+        </p:nvSpPr>
+        <p:spPr>
+          <a:xfrm>
+            <a:off x="7023402" y="2521231"/>
+            <a:ext cx="45720" cy="45720"/>
+          </a:xfrm>
+          <a:prstGeom prst="ellipse">
+            <a:avLst/>
+          </a:prstGeom>
+          <a:solidFill>
+            <a:schemeClr val="tx1"/>
+          </a:solidFill>
+          <a:ln>
+            <a:solidFill>
+              <a:schemeClr val="tx1"/>
+            </a:solidFill>
+          </a:ln>
+        </p:spPr>
+        <p:style>
+          <a:lnRef idx="2">
+            <a:schemeClr val="accent1">
+              <a:shade val="15000"/>
+            </a:schemeClr>
+          </a:lnRef>
+          <a:fillRef idx="1">
+            <a:schemeClr val="accent1"/>
+          </a:fillRef>
+          <a:effectRef idx="0">
+            <a:schemeClr val="accent1"/>
+          </a:effectRef>
+          <a:fontRef idx="minor">
+            <a:schemeClr val="lt1"/>
+          </a:fontRef>
+        </p:style>
+        <p:txBody>
+          <a:bodyPr rtlCol="0" anchor="ctr"/>
+          <a:lstStyle/>
+          <a:p>
+            <a:pPr algn="ctr"/>
+            <a:endParaRPr lang="en-US"/>
+          </a:p>
+        </p:txBody>
+      </p:sp>
+      <p:sp>
+        <p:nvSpPr>
+          <p:cNvPr id="1041" name="Oval 1040">
+            <a:extLst>
+              <a:ext uri="{FF2B5EF4-FFF2-40B4-BE49-F238E27FC236}">
+                <a16:creationId xmlns:a16="http://schemas.microsoft.com/office/drawing/2014/main" id="{28207E4B-A342-AB66-21FD-431512C93200}"/>
+              </a:ext>
+            </a:extLst>
+          </p:cNvPr>
+          <p:cNvSpPr>
+            <a:spLocks/>
+          </p:cNvSpPr>
+          <p:nvPr/>
+        </p:nvSpPr>
+        <p:spPr>
+          <a:xfrm>
+            <a:off x="7132547" y="2521231"/>
+            <a:ext cx="45720" cy="45720"/>
+          </a:xfrm>
+          <a:prstGeom prst="ellipse">
+            <a:avLst/>
+          </a:prstGeom>
+          <a:solidFill>
+            <a:schemeClr val="tx1"/>
+          </a:solidFill>
+          <a:ln>
+            <a:solidFill>
+              <a:schemeClr val="tx1"/>
+            </a:solidFill>
+          </a:ln>
+        </p:spPr>
+        <p:style>
+          <a:lnRef idx="2">
+            <a:schemeClr val="accent1">
+              <a:shade val="15000"/>
+            </a:schemeClr>
+          </a:lnRef>
+          <a:fillRef idx="1">
+            <a:schemeClr val="accent1"/>
+          </a:fillRef>
+          <a:effectRef idx="0">
+            <a:schemeClr val="accent1"/>
+          </a:effectRef>
+          <a:fontRef idx="minor">
+            <a:schemeClr val="lt1"/>
+          </a:fontRef>
+        </p:style>
+        <p:txBody>
+          <a:bodyPr rtlCol="0" anchor="ctr"/>
+          <a:lstStyle/>
+          <a:p>
+            <a:pPr algn="ctr"/>
+            <a:endParaRPr lang="en-US"/>
+          </a:p>
+        </p:txBody>
+      </p:sp>
+      <p:sp>
+        <p:nvSpPr>
+          <p:cNvPr id="1042" name="Oval 1041">
+            <a:extLst>
+              <a:ext uri="{FF2B5EF4-FFF2-40B4-BE49-F238E27FC236}">
+                <a16:creationId xmlns:a16="http://schemas.microsoft.com/office/drawing/2014/main" id="{9BF74473-719D-941B-CD24-604BA913828F}"/>
+              </a:ext>
+            </a:extLst>
+          </p:cNvPr>
+          <p:cNvSpPr>
+            <a:spLocks/>
+          </p:cNvSpPr>
+          <p:nvPr/>
+        </p:nvSpPr>
+        <p:spPr>
+          <a:xfrm>
+            <a:off x="6909502" y="4000758"/>
+            <a:ext cx="45720" cy="45720"/>
+          </a:xfrm>
+          <a:prstGeom prst="ellipse">
+            <a:avLst/>
+          </a:prstGeom>
+          <a:solidFill>
+            <a:schemeClr val="tx1"/>
+          </a:solidFill>
+          <a:ln>
+            <a:solidFill>
+              <a:schemeClr val="tx1"/>
+            </a:solidFill>
+          </a:ln>
+        </p:spPr>
+        <p:style>
+          <a:lnRef idx="2">
+            <a:schemeClr val="accent1">
+              <a:shade val="15000"/>
+            </a:schemeClr>
+          </a:lnRef>
+          <a:fillRef idx="1">
+            <a:schemeClr val="accent1"/>
+          </a:fillRef>
+          <a:effectRef idx="0">
+            <a:schemeClr val="accent1"/>
+          </a:effectRef>
+          <a:fontRef idx="minor">
+            <a:schemeClr val="lt1"/>
+          </a:fontRef>
+        </p:style>
+        <p:txBody>
+          <a:bodyPr rtlCol="0" anchor="ctr"/>
+          <a:lstStyle/>
+          <a:p>
+            <a:pPr algn="ctr"/>
+            <a:endParaRPr lang="en-US"/>
+          </a:p>
+        </p:txBody>
+      </p:sp>
+      <p:sp>
+        <p:nvSpPr>
+          <p:cNvPr id="1043" name="Oval 1042">
+            <a:extLst>
+              <a:ext uri="{FF2B5EF4-FFF2-40B4-BE49-F238E27FC236}">
+                <a16:creationId xmlns:a16="http://schemas.microsoft.com/office/drawing/2014/main" id="{0CF3F1C2-EEC0-26FC-3A4E-F19BC4CFE361}"/>
+              </a:ext>
+            </a:extLst>
+          </p:cNvPr>
+          <p:cNvSpPr>
+            <a:spLocks/>
+          </p:cNvSpPr>
+          <p:nvPr/>
+        </p:nvSpPr>
+        <p:spPr>
+          <a:xfrm>
+            <a:off x="7018648" y="4000758"/>
+            <a:ext cx="45720" cy="45720"/>
+          </a:xfrm>
+          <a:prstGeom prst="ellipse">
+            <a:avLst/>
+          </a:prstGeom>
+          <a:solidFill>
+            <a:schemeClr val="tx1"/>
+          </a:solidFill>
+          <a:ln>
+            <a:solidFill>
+              <a:schemeClr val="tx1"/>
+            </a:solidFill>
+          </a:ln>
+        </p:spPr>
+        <p:style>
+          <a:lnRef idx="2">
+            <a:schemeClr val="accent1">
+              <a:shade val="15000"/>
+            </a:schemeClr>
+          </a:lnRef>
+          <a:fillRef idx="1">
+            <a:schemeClr val="accent1"/>
+          </a:fillRef>
+          <a:effectRef idx="0">
+            <a:schemeClr val="accent1"/>
+          </a:effectRef>
+          <a:fontRef idx="minor">
+            <a:schemeClr val="lt1"/>
+          </a:fontRef>
+        </p:style>
+        <p:txBody>
+          <a:bodyPr rtlCol="0" anchor="ctr"/>
+          <a:lstStyle/>
+          <a:p>
+            <a:pPr algn="ctr"/>
+            <a:endParaRPr lang="en-US"/>
+          </a:p>
+        </p:txBody>
+      </p:sp>
+      <p:sp>
+        <p:nvSpPr>
+          <p:cNvPr id="1044" name="Oval 1043">
+            <a:extLst>
+              <a:ext uri="{FF2B5EF4-FFF2-40B4-BE49-F238E27FC236}">
+                <a16:creationId xmlns:a16="http://schemas.microsoft.com/office/drawing/2014/main" id="{48DE98AA-55DD-4086-785F-8E5C35F7E17B}"/>
+              </a:ext>
+            </a:extLst>
+          </p:cNvPr>
+          <p:cNvSpPr>
+            <a:spLocks/>
+          </p:cNvSpPr>
+          <p:nvPr/>
+        </p:nvSpPr>
+        <p:spPr>
+          <a:xfrm>
+            <a:off x="7127793" y="4000758"/>
+            <a:ext cx="45720" cy="45720"/>
+          </a:xfrm>
+          <a:prstGeom prst="ellipse">
+            <a:avLst/>
+          </a:prstGeom>
+          <a:solidFill>
+            <a:schemeClr val="tx1"/>
+          </a:solidFill>
+          <a:ln>
+            <a:solidFill>
+              <a:schemeClr val="tx1"/>
+            </a:solidFill>
+          </a:ln>
+        </p:spPr>
+        <p:style>
+          <a:lnRef idx="2">
+            <a:schemeClr val="accent1">
+              <a:shade val="15000"/>
+            </a:schemeClr>
+          </a:lnRef>
+          <a:fillRef idx="1">
+            <a:schemeClr val="accent1"/>
+          </a:fillRef>
+          <a:effectRef idx="0">
+            <a:schemeClr val="accent1"/>
+          </a:effectRef>
+          <a:fontRef idx="minor">
+            <a:schemeClr val="lt1"/>
+          </a:fontRef>
+        </p:style>
+        <p:txBody>
+          <a:bodyPr rtlCol="0" anchor="ctr"/>
+          <a:lstStyle/>
+          <a:p>
+            <a:pPr algn="ctr"/>
+            <a:endParaRPr lang="en-US"/>
+          </a:p>
+        </p:txBody>
+      </p:sp>
+      <p:grpSp>
+        <p:nvGrpSpPr>
+          <p:cNvPr id="1057" name="Group 1056">
+            <a:extLst>
+              <a:ext uri="{FF2B5EF4-FFF2-40B4-BE49-F238E27FC236}">
+                <a16:creationId xmlns:a16="http://schemas.microsoft.com/office/drawing/2014/main" id="{83D010E0-0398-2801-6C90-E4FABAB78341}"/>
+              </a:ext>
+            </a:extLst>
+          </p:cNvPr>
+          <p:cNvGrpSpPr/>
+          <p:nvPr/>
+        </p:nvGrpSpPr>
+        <p:grpSpPr>
+          <a:xfrm>
+            <a:off x="6907515" y="5457940"/>
+            <a:ext cx="264011" cy="45720"/>
+            <a:chOff x="7061902" y="4153158"/>
+            <a:chExt cx="264011" cy="45720"/>
+          </a:xfrm>
+        </p:grpSpPr>
+        <p:sp>
+          <p:nvSpPr>
+            <p:cNvPr id="1054" name="Oval 1053">
+              <a:extLst>
+                <a:ext uri="{FF2B5EF4-FFF2-40B4-BE49-F238E27FC236}">
+                  <a16:creationId xmlns:a16="http://schemas.microsoft.com/office/drawing/2014/main" id="{D003D1F9-B132-59D5-8CC3-57C471BEAD0F}"/>
+                </a:ext>
+              </a:extLst>
+            </p:cNvPr>
+            <p:cNvSpPr>
+              <a:spLocks/>
+            </p:cNvSpPr>
+            <p:nvPr/>
+          </p:nvSpPr>
+          <p:spPr>
+            <a:xfrm>
+              <a:off x="7061902" y="4153158"/>
+              <a:ext cx="45720" cy="45720"/>
+            </a:xfrm>
+            <a:prstGeom prst="ellipse">
+              <a:avLst/>
+            </a:prstGeom>
+            <a:solidFill>
+              <a:schemeClr val="tx1"/>
+            </a:solidFill>
+            <a:ln>
+              <a:solidFill>
+                <a:schemeClr val="tx1"/>
+              </a:solidFill>
+            </a:ln>
+          </p:spPr>
+          <p:style>
+            <a:lnRef idx="2">
+              <a:schemeClr val="accent1">
+                <a:shade val="15000"/>
+              </a:schemeClr>
+            </a:lnRef>
+            <a:fillRef idx="1">
+              <a:schemeClr val="accent1"/>
+            </a:fillRef>
+            <a:effectRef idx="0">
+              <a:schemeClr val="accent1"/>
+            </a:effectRef>
+            <a:fontRef idx="minor">
+              <a:schemeClr val="lt1"/>
+            </a:fontRef>
+          </p:style>
+          <p:txBody>
+            <a:bodyPr rtlCol="0" anchor="ctr"/>
+            <a:lstStyle/>
+            <a:p>
+              <a:pPr algn="ctr"/>
+              <a:endParaRPr lang="en-US"/>
+            </a:p>
+          </p:txBody>
+        </p:sp>
+        <p:sp>
+          <p:nvSpPr>
+            <p:cNvPr id="1055" name="Oval 1054">
+              <a:extLst>
+                <a:ext uri="{FF2B5EF4-FFF2-40B4-BE49-F238E27FC236}">
+                  <a16:creationId xmlns:a16="http://schemas.microsoft.com/office/drawing/2014/main" id="{5FA38E50-37EF-F14D-19C1-A7C08F3241C1}"/>
+                </a:ext>
+              </a:extLst>
+            </p:cNvPr>
+            <p:cNvSpPr>
+              <a:spLocks/>
+            </p:cNvSpPr>
+            <p:nvPr/>
+          </p:nvSpPr>
+          <p:spPr>
+            <a:xfrm>
+              <a:off x="7171048" y="4153158"/>
+              <a:ext cx="45720" cy="45720"/>
+            </a:xfrm>
+            <a:prstGeom prst="ellipse">
+              <a:avLst/>
+            </a:prstGeom>
+            <a:solidFill>
+              <a:schemeClr val="tx1"/>
+            </a:solidFill>
+            <a:ln>
+              <a:solidFill>
+                <a:schemeClr val="tx1"/>
+              </a:solidFill>
+            </a:ln>
+          </p:spPr>
+          <p:style>
+            <a:lnRef idx="2">
+              <a:schemeClr val="accent1">
+                <a:shade val="15000"/>
+              </a:schemeClr>
+            </a:lnRef>
+            <a:fillRef idx="1">
+              <a:schemeClr val="accent1"/>
+            </a:fillRef>
+            <a:effectRef idx="0">
+              <a:schemeClr val="accent1"/>
+            </a:effectRef>
+            <a:fontRef idx="minor">
+              <a:schemeClr val="lt1"/>
+            </a:fontRef>
+          </p:style>
+          <p:txBody>
+            <a:bodyPr rtlCol="0" anchor="ctr"/>
+            <a:lstStyle/>
+            <a:p>
+              <a:pPr algn="ctr"/>
+              <a:endParaRPr lang="en-US"/>
+            </a:p>
+          </p:txBody>
+        </p:sp>
+        <p:sp>
+          <p:nvSpPr>
+            <p:cNvPr id="1056" name="Oval 1055">
+              <a:extLst>
+                <a:ext uri="{FF2B5EF4-FFF2-40B4-BE49-F238E27FC236}">
+                  <a16:creationId xmlns:a16="http://schemas.microsoft.com/office/drawing/2014/main" id="{AAE65328-6003-AADA-41FE-B85F8776265A}"/>
+                </a:ext>
+              </a:extLst>
+            </p:cNvPr>
+            <p:cNvSpPr>
+              <a:spLocks/>
+            </p:cNvSpPr>
+            <p:nvPr/>
+          </p:nvSpPr>
+          <p:spPr>
+            <a:xfrm>
+              <a:off x="7280193" y="4153158"/>
+              <a:ext cx="45720" cy="45720"/>
+            </a:xfrm>
+            <a:prstGeom prst="ellipse">
+              <a:avLst/>
+            </a:prstGeom>
+            <a:solidFill>
+              <a:schemeClr val="tx1"/>
+            </a:solidFill>
+            <a:ln>
+              <a:solidFill>
+                <a:schemeClr val="tx1"/>
+              </a:solidFill>
+            </a:ln>
+          </p:spPr>
+          <p:style>
+            <a:lnRef idx="2">
+              <a:schemeClr val="accent1">
+                <a:shade val="15000"/>
+              </a:schemeClr>
+            </a:lnRef>
+            <a:fillRef idx="1">
+              <a:schemeClr val="accent1"/>
+            </a:fillRef>
+            <a:effectRef idx="0">
+              <a:schemeClr val="accent1"/>
+            </a:effectRef>
+            <a:fontRef idx="minor">
+              <a:schemeClr val="lt1"/>
+            </a:fontRef>
+          </p:style>
+          <p:txBody>
+            <a:bodyPr rtlCol="0" anchor="ctr"/>
+            <a:lstStyle/>
+            <a:p>
+              <a:pPr algn="ctr"/>
+              <a:endParaRPr lang="en-US"/>
+            </a:p>
+          </p:txBody>
+        </p:sp>
+      </p:grpSp>
     </p:spTree>
     <p:extLst>
       <p:ext uri="{BB962C8B-B14F-4D97-AF65-F5344CB8AC3E}">

</xml_diff>